<commit_message>
Update 2026-02-19: embed podcast player in HTML, fix PPTX even distribution
- HTML再生成: ポッドキャストプレーヤー埋め込み（11分23秒/13MB）
- PPTX再生成: Top News均等配分ロジック適用

Co-Authored-By: Claude Opus 4.6 <noreply@anthropic.com>
</commit_message>
<xml_diff>
--- a/2026-02-19/report_2026-02-19.pptx
+++ b/2026-02-19/report_2026-02-19.pptx
@@ -5684,7 +5684,7 @@
               </a:defRPr>
             </a:pPr>
             <a:r>
-              <a:t>► CNBC: https://www.cnbc.com/2026/02/18/anthropic-pentagon-ai-defense-war-surveillance.html</a:t>
+              <a:t>► Fortune: https://fortune.com/2026/02/18/dragonfly-term-sheet-venture-capital-blockchain-crypto-polymarket-rain/</a:t>
             </a:r>
           </a:p>
           <a:p>
@@ -5716,7 +5716,7 @@
               </a:defRPr>
             </a:pPr>
             <a:r>
-              <a:t>► Fortune: https://fortune.com/2026/02/18/dragonfly-term-sheet-venture-capital-blockchain-crypto-polymarket-rain/</a:t>
+              <a:t>► CNBC: https://www.cnbc.com/2026/02/17/meta-nvidia-deal-ai-data-center-chips.html</a:t>
             </a:r>
           </a:p>
           <a:p>
@@ -5732,7 +5732,7 @@
               </a:defRPr>
             </a:pPr>
             <a:r>
-              <a:t>► CNBC: https://www.cnbc.com/2026/02/13/anthropic-open-ai-super-bowl-ads.html</a:t>
+              <a:t>► CNBC: https://www.cnbc.com/2026/02/18/anthropic-pentagon-ai-defense-war-surveillance.html</a:t>
             </a:r>
           </a:p>
         </p:txBody>
@@ -5813,7 +5813,7 @@
               </a:defRPr>
             </a:pPr>
             <a:r>
-              <a:t>► CNBC: https://www.cnbc.com/2026/02/17/meta-nvidia-deal-ai-data-center-chips.html</a:t>
+              <a:t>► CNBC: https://www.cnbc.com/2026/02/13/anthropic-open-ai-super-bowl-ads.html</a:t>
             </a:r>
           </a:p>
         </p:txBody>
@@ -13860,482 +13860,6 @@
           </a:p>
         </p:txBody>
       </p:sp>
-      <p:sp>
-        <p:nvSpPr>
-          <p:cNvPr id="31" name="Rectangle 30"/>
-          <p:cNvSpPr/>
-          <p:nvPr/>
-        </p:nvSpPr>
-        <p:spPr>
-          <a:xfrm>
-            <a:off x="548640" y="4526280"/>
-            <a:ext cx="11094415" cy="1645920"/>
-          </a:xfrm>
-          <a:prstGeom prst="rect">
-            <a:avLst/>
-          </a:prstGeom>
-          <a:solidFill>
-            <a:srgbClr val="E8F1F8"/>
-          </a:solidFill>
-          <a:ln>
-            <a:noFill/>
-          </a:ln>
-        </p:spPr>
-        <p:style>
-          <a:lnRef idx="1">
-            <a:schemeClr val="accent1"/>
-          </a:lnRef>
-          <a:fillRef idx="3">
-            <a:schemeClr val="accent1"/>
-          </a:fillRef>
-          <a:effectRef idx="2">
-            <a:schemeClr val="accent1"/>
-          </a:effectRef>
-          <a:fontRef idx="minor">
-            <a:schemeClr val="lt1"/>
-          </a:fontRef>
-        </p:style>
-        <p:txBody>
-          <a:bodyPr rtlCol="0" anchor="ctr"/>
-          <a:lstStyle/>
-          <a:p>
-            <a:pPr algn="ctr"/>
-          </a:p>
-        </p:txBody>
-      </p:sp>
-      <p:sp>
-        <p:nvSpPr>
-          <p:cNvPr id="32" name="Rectangle 31"/>
-          <p:cNvSpPr/>
-          <p:nvPr/>
-        </p:nvSpPr>
-        <p:spPr>
-          <a:xfrm>
-            <a:off x="548640" y="4526280"/>
-            <a:ext cx="54864" cy="1645920"/>
-          </a:xfrm>
-          <a:prstGeom prst="rect">
-            <a:avLst/>
-          </a:prstGeom>
-          <a:solidFill>
-            <a:srgbClr val="D4A574"/>
-          </a:solidFill>
-          <a:ln>
-            <a:noFill/>
-          </a:ln>
-        </p:spPr>
-        <p:style>
-          <a:lnRef idx="1">
-            <a:schemeClr val="accent1"/>
-          </a:lnRef>
-          <a:fillRef idx="3">
-            <a:schemeClr val="accent1"/>
-          </a:fillRef>
-          <a:effectRef idx="2">
-            <a:schemeClr val="accent1"/>
-          </a:effectRef>
-          <a:fontRef idx="minor">
-            <a:schemeClr val="lt1"/>
-          </a:fontRef>
-        </p:style>
-        <p:txBody>
-          <a:bodyPr rtlCol="0" anchor="ctr"/>
-          <a:lstStyle/>
-          <a:p>
-            <a:pPr algn="ctr"/>
-          </a:p>
-        </p:txBody>
-      </p:sp>
-      <p:sp>
-        <p:nvSpPr>
-          <p:cNvPr id="33" name="Oval 32"/>
-          <p:cNvSpPr/>
-          <p:nvPr/>
-        </p:nvSpPr>
-        <p:spPr>
-          <a:xfrm>
-            <a:off x="685800" y="4663440"/>
-            <a:ext cx="457200" cy="457200"/>
-          </a:xfrm>
-          <a:prstGeom prst="ellipse">
-            <a:avLst/>
-          </a:prstGeom>
-          <a:solidFill>
-            <a:srgbClr val="D4A574"/>
-          </a:solidFill>
-          <a:ln>
-            <a:noFill/>
-          </a:ln>
-        </p:spPr>
-        <p:style>
-          <a:lnRef idx="1">
-            <a:schemeClr val="accent1"/>
-          </a:lnRef>
-          <a:fillRef idx="3">
-            <a:schemeClr val="accent1"/>
-          </a:fillRef>
-          <a:effectRef idx="2">
-            <a:schemeClr val="accent1"/>
-          </a:effectRef>
-          <a:fontRef idx="minor">
-            <a:schemeClr val="lt1"/>
-          </a:fontRef>
-        </p:style>
-        <p:txBody>
-          <a:bodyPr rtlCol="0" anchor="ctr"/>
-          <a:lstStyle/>
-          <a:p>
-            <a:pPr algn="ctr"/>
-          </a:p>
-        </p:txBody>
-      </p:sp>
-      <p:sp>
-        <p:nvSpPr>
-          <p:cNvPr id="34" name="TextBox 33"/>
-          <p:cNvSpPr txBox="1"/>
-          <p:nvPr/>
-        </p:nvSpPr>
-        <p:spPr>
-          <a:xfrm>
-            <a:off x="685800" y="4663440"/>
-            <a:ext cx="457200" cy="457200"/>
-          </a:xfrm>
-          <a:prstGeom prst="rect">
-            <a:avLst/>
-          </a:prstGeom>
-          <a:noFill/>
-        </p:spPr>
-        <p:txBody>
-          <a:bodyPr wrap="square" anchor="ctr">
-            <a:spAutoFit/>
-          </a:bodyPr>
-          <a:lstStyle/>
-          <a:p>
-            <a:pPr algn="ctr">
-              <a:defRPr sz="1800" b="1">
-                <a:solidFill>
-                  <a:srgbClr val="FFFFFF"/>
-                </a:solidFill>
-                <a:latin typeface="Meiryo"/>
-              </a:defRPr>
-            </a:pPr>
-            <a:r>
-              <a:t>4</a:t>
-            </a:r>
-          </a:p>
-        </p:txBody>
-      </p:sp>
-      <p:sp>
-        <p:nvSpPr>
-          <p:cNvPr id="35" name="Rounded Rectangle 34"/>
-          <p:cNvSpPr/>
-          <p:nvPr/>
-        </p:nvSpPr>
-        <p:spPr>
-          <a:xfrm>
-            <a:off x="1234440" y="4818888"/>
-            <a:ext cx="1828800" cy="109728"/>
-          </a:xfrm>
-          <a:prstGeom prst="roundRect">
-            <a:avLst/>
-          </a:prstGeom>
-          <a:solidFill>
-            <a:srgbClr val="FFFFFF"/>
-          </a:solidFill>
-          <a:ln>
-            <a:noFill/>
-          </a:ln>
-        </p:spPr>
-        <p:style>
-          <a:lnRef idx="1">
-            <a:schemeClr val="accent1"/>
-          </a:lnRef>
-          <a:fillRef idx="3">
-            <a:schemeClr val="accent1"/>
-          </a:fillRef>
-          <a:effectRef idx="2">
-            <a:schemeClr val="accent1"/>
-          </a:effectRef>
-          <a:fontRef idx="minor">
-            <a:schemeClr val="lt1"/>
-          </a:fontRef>
-        </p:style>
-        <p:txBody>
-          <a:bodyPr rtlCol="0" anchor="ctr"/>
-          <a:lstStyle/>
-          <a:p>
-            <a:pPr algn="ctr"/>
-          </a:p>
-        </p:txBody>
-      </p:sp>
-      <p:sp>
-        <p:nvSpPr>
-          <p:cNvPr id="36" name="Rounded Rectangle 35"/>
-          <p:cNvSpPr/>
-          <p:nvPr/>
-        </p:nvSpPr>
-        <p:spPr>
-          <a:xfrm>
-            <a:off x="1234440" y="4818888"/>
-            <a:ext cx="1463040" cy="109728"/>
-          </a:xfrm>
-          <a:prstGeom prst="roundRect">
-            <a:avLst/>
-          </a:prstGeom>
-          <a:solidFill>
-            <a:srgbClr val="D4A574"/>
-          </a:solidFill>
-          <a:ln>
-            <a:noFill/>
-          </a:ln>
-        </p:spPr>
-        <p:style>
-          <a:lnRef idx="1">
-            <a:schemeClr val="accent1"/>
-          </a:lnRef>
-          <a:fillRef idx="3">
-            <a:schemeClr val="accent1"/>
-          </a:fillRef>
-          <a:effectRef idx="2">
-            <a:schemeClr val="accent1"/>
-          </a:effectRef>
-          <a:fontRef idx="minor">
-            <a:schemeClr val="lt1"/>
-          </a:fontRef>
-        </p:style>
-        <p:txBody>
-          <a:bodyPr rtlCol="0" anchor="ctr"/>
-          <a:lstStyle/>
-          <a:p>
-            <a:pPr algn="ctr"/>
-          </a:p>
-        </p:txBody>
-      </p:sp>
-      <p:sp>
-        <p:nvSpPr>
-          <p:cNvPr id="37" name="TextBox 36"/>
-          <p:cNvSpPr txBox="1"/>
-          <p:nvPr/>
-        </p:nvSpPr>
-        <p:spPr>
-          <a:xfrm>
-            <a:off x="1234440" y="4599432"/>
-            <a:ext cx="8229600" cy="274320"/>
-          </a:xfrm>
-          <a:prstGeom prst="rect">
-            <a:avLst/>
-          </a:prstGeom>
-          <a:noFill/>
-        </p:spPr>
-        <p:txBody>
-          <a:bodyPr wrap="square">
-            <a:spAutoFit/>
-          </a:bodyPr>
-          <a:lstStyle/>
-          <a:p>
-            <a:pPr algn="l">
-              <a:defRPr sz="1500" b="1">
-                <a:solidFill>
-                  <a:srgbClr val="1A1A2E"/>
-                </a:solidFill>
-                <a:latin typeface="Meiryo"/>
-              </a:defRPr>
-            </a:pPr>
-            <a:r>
-              <a:t>Anthropic Super Bowl LX 広告キャンペーン成功：Claude アプリが米国 App Store 41位から Top 10 躍進、OpenAI との『消費者向けAI市場』での直接競争激化</a:t>
-            </a:r>
-          </a:p>
-        </p:txBody>
-      </p:sp>
-      <p:sp>
-        <p:nvSpPr>
-          <p:cNvPr id="38" name="TextBox 37"/>
-          <p:cNvSpPr txBox="1"/>
-          <p:nvPr/>
-        </p:nvSpPr>
-        <p:spPr>
-          <a:xfrm>
-            <a:off x="731520" y="5029200"/>
-            <a:ext cx="6675120" cy="731520"/>
-          </a:xfrm>
-          <a:prstGeom prst="rect">
-            <a:avLst/>
-          </a:prstGeom>
-          <a:noFill/>
-        </p:spPr>
-        <p:txBody>
-          <a:bodyPr wrap="square">
-            <a:spAutoFit/>
-          </a:bodyPr>
-          <a:lstStyle/>
-          <a:p>
-            <a:pPr algn="l">
-              <a:defRPr sz="1100" b="0">
-                <a:solidFill>
-                  <a:srgbClr val="1A1A2E"/>
-                </a:solidFill>
-                <a:latin typeface="Meiryo"/>
-              </a:defRPr>
-            </a:pPr>
-            <a:r>
-              <a:t>Anthropic が Super Bowl LX（2月2日）で OpenAI を批判する Claude 広告を放映。BNP Paribas data analysis で『Anthropic が highest increase in site visits &amp; users』。...</a:t>
-            </a:r>
-          </a:p>
-        </p:txBody>
-      </p:sp>
-      <p:sp>
-        <p:nvSpPr>
-          <p:cNvPr id="39" name="Rounded Rectangle 38"/>
-          <p:cNvSpPr/>
-          <p:nvPr/>
-        </p:nvSpPr>
-        <p:spPr>
-          <a:xfrm>
-            <a:off x="7315200" y="4937760"/>
-            <a:ext cx="4114800" cy="1005840"/>
-          </a:xfrm>
-          <a:prstGeom prst="roundRect">
-            <a:avLst/>
-          </a:prstGeom>
-          <a:solidFill>
-            <a:srgbClr val="E8F1F8"/>
-          </a:solidFill>
-          <a:ln w="12700">
-            <a:solidFill>
-              <a:srgbClr val="5BA4D9"/>
-            </a:solidFill>
-          </a:ln>
-        </p:spPr>
-        <p:style>
-          <a:lnRef idx="1">
-            <a:schemeClr val="accent1"/>
-          </a:lnRef>
-          <a:fillRef idx="3">
-            <a:schemeClr val="accent1"/>
-          </a:fillRef>
-          <a:effectRef idx="2">
-            <a:schemeClr val="accent1"/>
-          </a:effectRef>
-          <a:fontRef idx="minor">
-            <a:schemeClr val="lt1"/>
-          </a:fontRef>
-        </p:style>
-        <p:txBody>
-          <a:bodyPr rtlCol="0" anchor="ctr"/>
-          <a:lstStyle/>
-          <a:p>
-            <a:pPr algn="ctr"/>
-          </a:p>
-        </p:txBody>
-      </p:sp>
-      <p:sp>
-        <p:nvSpPr>
-          <p:cNvPr id="40" name="TextBox 39"/>
-          <p:cNvSpPr txBox="1"/>
-          <p:nvPr/>
-        </p:nvSpPr>
-        <p:spPr>
-          <a:xfrm>
-            <a:off x="7406640" y="4956048"/>
-            <a:ext cx="3931920" cy="182880"/>
-          </a:xfrm>
-          <a:prstGeom prst="rect">
-            <a:avLst/>
-          </a:prstGeom>
-          <a:noFill/>
-        </p:spPr>
-        <p:txBody>
-          <a:bodyPr wrap="square">
-            <a:spAutoFit/>
-          </a:bodyPr>
-          <a:lstStyle/>
-          <a:p>
-            <a:pPr algn="l">
-              <a:defRPr sz="800" b="1">
-                <a:solidFill>
-                  <a:srgbClr val="005BAB"/>
-                </a:solidFill>
-                <a:latin typeface="Meiryo"/>
-              </a:defRPr>
-            </a:pPr>
-            <a:r>
-              <a:t>IMPACT</a:t>
-            </a:r>
-          </a:p>
-        </p:txBody>
-      </p:sp>
-      <p:sp>
-        <p:nvSpPr>
-          <p:cNvPr id="41" name="TextBox 40"/>
-          <p:cNvSpPr txBox="1"/>
-          <p:nvPr/>
-        </p:nvSpPr>
-        <p:spPr>
-          <a:xfrm>
-            <a:off x="7406640" y="5138928"/>
-            <a:ext cx="3931920" cy="731520"/>
-          </a:xfrm>
-          <a:prstGeom prst="rect">
-            <a:avLst/>
-          </a:prstGeom>
-          <a:noFill/>
-        </p:spPr>
-        <p:txBody>
-          <a:bodyPr wrap="square">
-            <a:spAutoFit/>
-          </a:bodyPr>
-          <a:lstStyle/>
-          <a:p>
-            <a:pPr algn="l">
-              <a:defRPr sz="900" b="0">
-                <a:solidFill>
-                  <a:srgbClr val="1A1A2E"/>
-                </a:solidFill>
-                <a:latin typeface="Meiryo"/>
-              </a:defRPr>
-            </a:pPr>
-            <a:r>
-              <a:t>消費者向けAI市場での『brand competition』が激化。App store top 10 ranking が『default install behavior』driving。Super ...</a:t>
-            </a:r>
-          </a:p>
-        </p:txBody>
-      </p:sp>
-      <p:sp>
-        <p:nvSpPr>
-          <p:cNvPr id="42" name="TextBox 41"/>
-          <p:cNvSpPr txBox="1"/>
-          <p:nvPr/>
-        </p:nvSpPr>
-        <p:spPr>
-          <a:xfrm>
-            <a:off x="731520" y="5897880"/>
-            <a:ext cx="5486400" cy="228600"/>
-          </a:xfrm>
-          <a:prstGeom prst="rect">
-            <a:avLst/>
-          </a:prstGeom>
-          <a:noFill/>
-        </p:spPr>
-        <p:txBody>
-          <a:bodyPr wrap="square">
-            <a:spAutoFit/>
-          </a:bodyPr>
-          <a:lstStyle/>
-          <a:p>
-            <a:pPr algn="l">
-              <a:defRPr sz="1000" b="0">
-                <a:solidFill>
-                  <a:srgbClr val="6C757D"/>
-                </a:solidFill>
-                <a:latin typeface="Meiryo"/>
-              </a:defRPr>
-            </a:pPr>
-            <a:r>
-              <a:t>Anthropic  |  Business  |  CNBC</a:t>
-            </a:r>
-          </a:p>
-        </p:txBody>
-      </p:sp>
     </p:spTree>
   </p:cSld>
   <p:clrMapOvr>
@@ -14570,7 +14094,7 @@
             <a:avLst/>
           </a:prstGeom>
           <a:solidFill>
-            <a:srgbClr val="6C757D"/>
+            <a:srgbClr val="D4A574"/>
           </a:solidFill>
           <a:ln>
             <a:noFill/>
@@ -14613,7 +14137,7 @@
             <a:avLst/>
           </a:prstGeom>
           <a:solidFill>
-            <a:srgbClr val="6C757D"/>
+            <a:srgbClr val="D4A574"/>
           </a:solidFill>
           <a:ln>
             <a:noFill/>
@@ -14735,7 +14259,7 @@
             <a:avLst/>
           </a:prstGeom>
           <a:solidFill>
-            <a:srgbClr val="6C757D"/>
+            <a:srgbClr val="D4A574"/>
           </a:solidFill>
           <a:ln>
             <a:noFill/>
@@ -14794,7 +14318,7 @@
               </a:defRPr>
             </a:pPr>
             <a:r>
-              <a:t>ElevenLabs Series D ラウンド $500M 調達で AI Voice 企業の mega-round 加速、Runway AI video も $315M Series E で $5.3B valuation 達成</a:t>
+              <a:t>Anthropic Super Bowl LX 広告キャンペーン成功：Claude アプリが米国 App Store 41位から Top 10 躍進、OpenAI との『消費者向けAI市場』での直接競争激化</a:t>
             </a:r>
           </a:p>
         </p:txBody>
@@ -14830,7 +14354,7 @@
               </a:defRPr>
             </a:pPr>
             <a:r>
-              <a:t>Voice AI company ElevenLabs が $500M Series D fundraise を Sequoia Capital lead で発表（2月4日）。Valuation $11B に達成。同時期に Runway（AI video generation）が...</a:t>
+              <a:t>Anthropic が Super Bowl LX（2月2日）で OpenAI を批判する Claude 広告を放映。BNP Paribas data analysis で『Anthropic が highest increase in site visits &amp; users』。...</a:t>
             </a:r>
           </a:p>
         </p:txBody>
@@ -14947,7 +14471,7 @@
               </a:defRPr>
             </a:pPr>
             <a:r>
-              <a:t>Specialized AI application market の『consolidation stage』入り：voice AI・video gen・robotics AI での『de fact...</a:t>
+              <a:t>消費者向けAI市場での『brand competition』が激化。App store top 10 ranking が『default install behavior』driving。Super ...</a:t>
             </a:r>
           </a:p>
         </p:txBody>
@@ -14961,6 +14485,482 @@
         <p:spPr>
           <a:xfrm>
             <a:off x="731520" y="2331720"/>
+            <a:ext cx="5486400" cy="228600"/>
+          </a:xfrm>
+          <a:prstGeom prst="rect">
+            <a:avLst/>
+          </a:prstGeom>
+          <a:noFill/>
+        </p:spPr>
+        <p:txBody>
+          <a:bodyPr wrap="square">
+            <a:spAutoFit/>
+          </a:bodyPr>
+          <a:lstStyle/>
+          <a:p>
+            <a:pPr algn="l">
+              <a:defRPr sz="1000" b="0">
+                <a:solidFill>
+                  <a:srgbClr val="6C757D"/>
+                </a:solidFill>
+                <a:latin typeface="Meiryo"/>
+              </a:defRPr>
+            </a:pPr>
+            <a:r>
+              <a:t>Anthropic  |  Business  |  CNBC</a:t>
+            </a:r>
+          </a:p>
+        </p:txBody>
+      </p:sp>
+      <p:sp>
+        <p:nvSpPr>
+          <p:cNvPr id="18" name="Rectangle 17"/>
+          <p:cNvSpPr/>
+          <p:nvPr/>
+        </p:nvSpPr>
+        <p:spPr>
+          <a:xfrm>
+            <a:off x="548640" y="2743200"/>
+            <a:ext cx="11094415" cy="1645920"/>
+          </a:xfrm>
+          <a:prstGeom prst="rect">
+            <a:avLst/>
+          </a:prstGeom>
+          <a:solidFill>
+            <a:srgbClr val="E8F1F8"/>
+          </a:solidFill>
+          <a:ln>
+            <a:noFill/>
+          </a:ln>
+        </p:spPr>
+        <p:style>
+          <a:lnRef idx="1">
+            <a:schemeClr val="accent1"/>
+          </a:lnRef>
+          <a:fillRef idx="3">
+            <a:schemeClr val="accent1"/>
+          </a:fillRef>
+          <a:effectRef idx="2">
+            <a:schemeClr val="accent1"/>
+          </a:effectRef>
+          <a:fontRef idx="minor">
+            <a:schemeClr val="lt1"/>
+          </a:fontRef>
+        </p:style>
+        <p:txBody>
+          <a:bodyPr rtlCol="0" anchor="ctr"/>
+          <a:lstStyle/>
+          <a:p>
+            <a:pPr algn="ctr"/>
+          </a:p>
+        </p:txBody>
+      </p:sp>
+      <p:sp>
+        <p:nvSpPr>
+          <p:cNvPr id="19" name="Rectangle 18"/>
+          <p:cNvSpPr/>
+          <p:nvPr/>
+        </p:nvSpPr>
+        <p:spPr>
+          <a:xfrm>
+            <a:off x="548640" y="2743200"/>
+            <a:ext cx="54864" cy="1645920"/>
+          </a:xfrm>
+          <a:prstGeom prst="rect">
+            <a:avLst/>
+          </a:prstGeom>
+          <a:solidFill>
+            <a:srgbClr val="6C757D"/>
+          </a:solidFill>
+          <a:ln>
+            <a:noFill/>
+          </a:ln>
+        </p:spPr>
+        <p:style>
+          <a:lnRef idx="1">
+            <a:schemeClr val="accent1"/>
+          </a:lnRef>
+          <a:fillRef idx="3">
+            <a:schemeClr val="accent1"/>
+          </a:fillRef>
+          <a:effectRef idx="2">
+            <a:schemeClr val="accent1"/>
+          </a:effectRef>
+          <a:fontRef idx="minor">
+            <a:schemeClr val="lt1"/>
+          </a:fontRef>
+        </p:style>
+        <p:txBody>
+          <a:bodyPr rtlCol="0" anchor="ctr"/>
+          <a:lstStyle/>
+          <a:p>
+            <a:pPr algn="ctr"/>
+          </a:p>
+        </p:txBody>
+      </p:sp>
+      <p:sp>
+        <p:nvSpPr>
+          <p:cNvPr id="20" name="Oval 19"/>
+          <p:cNvSpPr/>
+          <p:nvPr/>
+        </p:nvSpPr>
+        <p:spPr>
+          <a:xfrm>
+            <a:off x="685800" y="2880360"/>
+            <a:ext cx="457200" cy="457200"/>
+          </a:xfrm>
+          <a:prstGeom prst="ellipse">
+            <a:avLst/>
+          </a:prstGeom>
+          <a:solidFill>
+            <a:srgbClr val="6C757D"/>
+          </a:solidFill>
+          <a:ln>
+            <a:noFill/>
+          </a:ln>
+        </p:spPr>
+        <p:style>
+          <a:lnRef idx="1">
+            <a:schemeClr val="accent1"/>
+          </a:lnRef>
+          <a:fillRef idx="3">
+            <a:schemeClr val="accent1"/>
+          </a:fillRef>
+          <a:effectRef idx="2">
+            <a:schemeClr val="accent1"/>
+          </a:effectRef>
+          <a:fontRef idx="minor">
+            <a:schemeClr val="lt1"/>
+          </a:fontRef>
+        </p:style>
+        <p:txBody>
+          <a:bodyPr rtlCol="0" anchor="ctr"/>
+          <a:lstStyle/>
+          <a:p>
+            <a:pPr algn="ctr"/>
+          </a:p>
+        </p:txBody>
+      </p:sp>
+      <p:sp>
+        <p:nvSpPr>
+          <p:cNvPr id="21" name="TextBox 20"/>
+          <p:cNvSpPr txBox="1"/>
+          <p:nvPr/>
+        </p:nvSpPr>
+        <p:spPr>
+          <a:xfrm>
+            <a:off x="685800" y="2880360"/>
+            <a:ext cx="457200" cy="457200"/>
+          </a:xfrm>
+          <a:prstGeom prst="rect">
+            <a:avLst/>
+          </a:prstGeom>
+          <a:noFill/>
+        </p:spPr>
+        <p:txBody>
+          <a:bodyPr wrap="square" anchor="ctr">
+            <a:spAutoFit/>
+          </a:bodyPr>
+          <a:lstStyle/>
+          <a:p>
+            <a:pPr algn="ctr">
+              <a:defRPr sz="1800" b="1">
+                <a:solidFill>
+                  <a:srgbClr val="FFFFFF"/>
+                </a:solidFill>
+                <a:latin typeface="Meiryo"/>
+              </a:defRPr>
+            </a:pPr>
+            <a:r>
+              <a:t>4</a:t>
+            </a:r>
+          </a:p>
+        </p:txBody>
+      </p:sp>
+      <p:sp>
+        <p:nvSpPr>
+          <p:cNvPr id="22" name="Rounded Rectangle 21"/>
+          <p:cNvSpPr/>
+          <p:nvPr/>
+        </p:nvSpPr>
+        <p:spPr>
+          <a:xfrm>
+            <a:off x="1234440" y="3035808"/>
+            <a:ext cx="1828800" cy="109728"/>
+          </a:xfrm>
+          <a:prstGeom prst="roundRect">
+            <a:avLst/>
+          </a:prstGeom>
+          <a:solidFill>
+            <a:srgbClr val="FFFFFF"/>
+          </a:solidFill>
+          <a:ln>
+            <a:noFill/>
+          </a:ln>
+        </p:spPr>
+        <p:style>
+          <a:lnRef idx="1">
+            <a:schemeClr val="accent1"/>
+          </a:lnRef>
+          <a:fillRef idx="3">
+            <a:schemeClr val="accent1"/>
+          </a:fillRef>
+          <a:effectRef idx="2">
+            <a:schemeClr val="accent1"/>
+          </a:effectRef>
+          <a:fontRef idx="minor">
+            <a:schemeClr val="lt1"/>
+          </a:fontRef>
+        </p:style>
+        <p:txBody>
+          <a:bodyPr rtlCol="0" anchor="ctr"/>
+          <a:lstStyle/>
+          <a:p>
+            <a:pPr algn="ctr"/>
+          </a:p>
+        </p:txBody>
+      </p:sp>
+      <p:sp>
+        <p:nvSpPr>
+          <p:cNvPr id="23" name="Rounded Rectangle 22"/>
+          <p:cNvSpPr/>
+          <p:nvPr/>
+        </p:nvSpPr>
+        <p:spPr>
+          <a:xfrm>
+            <a:off x="1234440" y="3035808"/>
+            <a:ext cx="1463040" cy="109728"/>
+          </a:xfrm>
+          <a:prstGeom prst="roundRect">
+            <a:avLst/>
+          </a:prstGeom>
+          <a:solidFill>
+            <a:srgbClr val="6C757D"/>
+          </a:solidFill>
+          <a:ln>
+            <a:noFill/>
+          </a:ln>
+        </p:spPr>
+        <p:style>
+          <a:lnRef idx="1">
+            <a:schemeClr val="accent1"/>
+          </a:lnRef>
+          <a:fillRef idx="3">
+            <a:schemeClr val="accent1"/>
+          </a:fillRef>
+          <a:effectRef idx="2">
+            <a:schemeClr val="accent1"/>
+          </a:effectRef>
+          <a:fontRef idx="minor">
+            <a:schemeClr val="lt1"/>
+          </a:fontRef>
+        </p:style>
+        <p:txBody>
+          <a:bodyPr rtlCol="0" anchor="ctr"/>
+          <a:lstStyle/>
+          <a:p>
+            <a:pPr algn="ctr"/>
+          </a:p>
+        </p:txBody>
+      </p:sp>
+      <p:sp>
+        <p:nvSpPr>
+          <p:cNvPr id="24" name="TextBox 23"/>
+          <p:cNvSpPr txBox="1"/>
+          <p:nvPr/>
+        </p:nvSpPr>
+        <p:spPr>
+          <a:xfrm>
+            <a:off x="1234440" y="2816352"/>
+            <a:ext cx="8229600" cy="274320"/>
+          </a:xfrm>
+          <a:prstGeom prst="rect">
+            <a:avLst/>
+          </a:prstGeom>
+          <a:noFill/>
+        </p:spPr>
+        <p:txBody>
+          <a:bodyPr wrap="square">
+            <a:spAutoFit/>
+          </a:bodyPr>
+          <a:lstStyle/>
+          <a:p>
+            <a:pPr algn="l">
+              <a:defRPr sz="1500" b="1">
+                <a:solidFill>
+                  <a:srgbClr val="1A1A2E"/>
+                </a:solidFill>
+                <a:latin typeface="Meiryo"/>
+              </a:defRPr>
+            </a:pPr>
+            <a:r>
+              <a:t>ElevenLabs Series D ラウンド $500M 調達で AI Voice 企業の mega-round 加速、Runway AI video も $315M Series E で $5.3B valuation 達成</a:t>
+            </a:r>
+          </a:p>
+        </p:txBody>
+      </p:sp>
+      <p:sp>
+        <p:nvSpPr>
+          <p:cNvPr id="25" name="TextBox 24"/>
+          <p:cNvSpPr txBox="1"/>
+          <p:nvPr/>
+        </p:nvSpPr>
+        <p:spPr>
+          <a:xfrm>
+            <a:off x="731520" y="3246120"/>
+            <a:ext cx="6675120" cy="731520"/>
+          </a:xfrm>
+          <a:prstGeom prst="rect">
+            <a:avLst/>
+          </a:prstGeom>
+          <a:noFill/>
+        </p:spPr>
+        <p:txBody>
+          <a:bodyPr wrap="square">
+            <a:spAutoFit/>
+          </a:bodyPr>
+          <a:lstStyle/>
+          <a:p>
+            <a:pPr algn="l">
+              <a:defRPr sz="1100" b="0">
+                <a:solidFill>
+                  <a:srgbClr val="1A1A2E"/>
+                </a:solidFill>
+                <a:latin typeface="Meiryo"/>
+              </a:defRPr>
+            </a:pPr>
+            <a:r>
+              <a:t>Voice AI company ElevenLabs が $500M Series D fundraise を Sequoia Capital lead で発表（2月4日）。Valuation $11B に達成。同時期に Runway（AI video generation）が...</a:t>
+            </a:r>
+          </a:p>
+        </p:txBody>
+      </p:sp>
+      <p:sp>
+        <p:nvSpPr>
+          <p:cNvPr id="26" name="Rounded Rectangle 25"/>
+          <p:cNvSpPr/>
+          <p:nvPr/>
+        </p:nvSpPr>
+        <p:spPr>
+          <a:xfrm>
+            <a:off x="7315200" y="3154680"/>
+            <a:ext cx="4114800" cy="1005840"/>
+          </a:xfrm>
+          <a:prstGeom prst="roundRect">
+            <a:avLst/>
+          </a:prstGeom>
+          <a:solidFill>
+            <a:srgbClr val="E8F1F8"/>
+          </a:solidFill>
+          <a:ln w="12700">
+            <a:solidFill>
+              <a:srgbClr val="5BA4D9"/>
+            </a:solidFill>
+          </a:ln>
+        </p:spPr>
+        <p:style>
+          <a:lnRef idx="1">
+            <a:schemeClr val="accent1"/>
+          </a:lnRef>
+          <a:fillRef idx="3">
+            <a:schemeClr val="accent1"/>
+          </a:fillRef>
+          <a:effectRef idx="2">
+            <a:schemeClr val="accent1"/>
+          </a:effectRef>
+          <a:fontRef idx="minor">
+            <a:schemeClr val="lt1"/>
+          </a:fontRef>
+        </p:style>
+        <p:txBody>
+          <a:bodyPr rtlCol="0" anchor="ctr"/>
+          <a:lstStyle/>
+          <a:p>
+            <a:pPr algn="ctr"/>
+          </a:p>
+        </p:txBody>
+      </p:sp>
+      <p:sp>
+        <p:nvSpPr>
+          <p:cNvPr id="27" name="TextBox 26"/>
+          <p:cNvSpPr txBox="1"/>
+          <p:nvPr/>
+        </p:nvSpPr>
+        <p:spPr>
+          <a:xfrm>
+            <a:off x="7406640" y="3172968"/>
+            <a:ext cx="3931920" cy="182880"/>
+          </a:xfrm>
+          <a:prstGeom prst="rect">
+            <a:avLst/>
+          </a:prstGeom>
+          <a:noFill/>
+        </p:spPr>
+        <p:txBody>
+          <a:bodyPr wrap="square">
+            <a:spAutoFit/>
+          </a:bodyPr>
+          <a:lstStyle/>
+          <a:p>
+            <a:pPr algn="l">
+              <a:defRPr sz="800" b="1">
+                <a:solidFill>
+                  <a:srgbClr val="005BAB"/>
+                </a:solidFill>
+                <a:latin typeface="Meiryo"/>
+              </a:defRPr>
+            </a:pPr>
+            <a:r>
+              <a:t>IMPACT</a:t>
+            </a:r>
+          </a:p>
+        </p:txBody>
+      </p:sp>
+      <p:sp>
+        <p:nvSpPr>
+          <p:cNvPr id="28" name="TextBox 27"/>
+          <p:cNvSpPr txBox="1"/>
+          <p:nvPr/>
+        </p:nvSpPr>
+        <p:spPr>
+          <a:xfrm>
+            <a:off x="7406640" y="3355848"/>
+            <a:ext cx="3931920" cy="731520"/>
+          </a:xfrm>
+          <a:prstGeom prst="rect">
+            <a:avLst/>
+          </a:prstGeom>
+          <a:noFill/>
+        </p:spPr>
+        <p:txBody>
+          <a:bodyPr wrap="square">
+            <a:spAutoFit/>
+          </a:bodyPr>
+          <a:lstStyle/>
+          <a:p>
+            <a:pPr algn="l">
+              <a:defRPr sz="900" b="0">
+                <a:solidFill>
+                  <a:srgbClr val="1A1A2E"/>
+                </a:solidFill>
+                <a:latin typeface="Meiryo"/>
+              </a:defRPr>
+            </a:pPr>
+            <a:r>
+              <a:t>Specialized AI application market の『consolidation stage』入り：voice AI・video gen・robotics AI での『de fact...</a:t>
+            </a:r>
+          </a:p>
+        </p:txBody>
+      </p:sp>
+      <p:sp>
+        <p:nvSpPr>
+          <p:cNvPr id="29" name="TextBox 28"/>
+          <p:cNvSpPr txBox="1"/>
+          <p:nvPr/>
+        </p:nvSpPr>
+        <p:spPr>
+          <a:xfrm>
+            <a:off x="731520" y="4114800"/>
             <a:ext cx="5486400" cy="228600"/>
           </a:xfrm>
           <a:prstGeom prst="rect">

</xml_diff>